<commit_message>
Add question form for Python lecture, small fixes
</commit_message>
<xml_diff>
--- a/13-Python-internals-and-JIT-compilers.pptx
+++ b/13-Python-internals-and-JIT-compilers.pptx
@@ -37,9 +37,9 @@
     <p:sldId id="384" r:id="rId28"/>
     <p:sldId id="368" r:id="rId29"/>
     <p:sldId id="383" r:id="rId30"/>
-    <p:sldId id="364" r:id="rId31"/>
-    <p:sldId id="341" r:id="rId32"/>
-    <p:sldId id="292" r:id="rId33"/>
+    <p:sldId id="341" r:id="rId31"/>
+    <p:sldId id="364" r:id="rId32"/>
+    <p:sldId id="302" r:id="rId33"/>
   </p:sldIdLst>
   <p:sldSz cx="12192000" cy="6858000"/>
   <p:notesSz cx="6858000" cy="9144000"/>
@@ -568,7 +568,7 @@
           <a:p>
             <a:fld id="{E10B726A-C477-6444-83BF-F1538D69AD12}" type="datetimeFigureOut">
               <a:rPr lang="en-US" smtClean="0"/>
-              <a:t>4/15/2024</a:t>
+              <a:t>5/14/2024</a:t>
             </a:fld>
             <a:endParaRPr lang="en-US"/>
           </a:p>
@@ -907,6 +907,156 @@
 </p:notes>
 </file>
 
+<file path=ppt/notesSlides/notesSlide2.xml><?xml version="1.0" encoding="utf-8"?>
+<p:notes xmlns:a="http://schemas.openxmlformats.org/drawingml/2006/main" xmlns:r="http://schemas.openxmlformats.org/officeDocument/2006/relationships" xmlns:p="http://schemas.openxmlformats.org/presentationml/2006/main" showMasterSp="0" showMasterPhAnim="0">
+  <p:cSld>
+    <p:spTree>
+      <p:nvGrpSpPr>
+        <p:cNvPr id="1" name="Shape 511"/>
+        <p:cNvGrpSpPr/>
+        <p:nvPr/>
+      </p:nvGrpSpPr>
+      <p:grpSpPr>
+        <a:xfrm>
+          <a:off x="0" y="0"/>
+          <a:ext cx="0" cy="0"/>
+          <a:chOff x="0" y="0"/>
+          <a:chExt cx="0" cy="0"/>
+        </a:xfrm>
+      </p:grpSpPr>
+      <p:sp>
+        <p:nvSpPr>
+          <p:cNvPr id="512" name="Google Shape;512;g270158642d6_0_591:notes"/>
+          <p:cNvSpPr>
+            <a:spLocks noGrp="1" noRot="1" noChangeAspect="1"/>
+          </p:cNvSpPr>
+          <p:nvPr>
+            <p:ph type="sldImg" idx="2"/>
+          </p:nvPr>
+        </p:nvSpPr>
+        <p:spPr>
+          <a:xfrm>
+            <a:off x="685800" y="1143000"/>
+            <a:ext cx="5486400" cy="3086100"/>
+          </a:xfrm>
+          <a:custGeom>
+            <a:avLst/>
+            <a:gdLst/>
+            <a:ahLst/>
+            <a:cxnLst/>
+            <a:rect l="l" t="t" r="r" b="b"/>
+            <a:pathLst>
+              <a:path w="120000" h="120000" extrusionOk="0">
+                <a:moveTo>
+                  <a:pt x="0" y="0"/>
+                </a:moveTo>
+                <a:lnTo>
+                  <a:pt x="120000" y="0"/>
+                </a:lnTo>
+                <a:lnTo>
+                  <a:pt x="120000" y="120000"/>
+                </a:lnTo>
+                <a:lnTo>
+                  <a:pt x="0" y="120000"/>
+                </a:lnTo>
+                <a:close/>
+              </a:path>
+            </a:pathLst>
+          </a:custGeom>
+        </p:spPr>
+      </p:sp>
+      <p:sp>
+        <p:nvSpPr>
+          <p:cNvPr id="513" name="Google Shape;513;g270158642d6_0_591:notes"/>
+          <p:cNvSpPr txBox="1">
+            <a:spLocks noGrp="1"/>
+          </p:cNvSpPr>
+          <p:nvPr>
+            <p:ph type="body" idx="1"/>
+          </p:nvPr>
+        </p:nvSpPr>
+        <p:spPr>
+          <a:xfrm>
+            <a:off x="685800" y="4400550"/>
+            <a:ext cx="5486400" cy="3600600"/>
+          </a:xfrm>
+          <a:prstGeom prst="rect">
+            <a:avLst/>
+          </a:prstGeom>
+        </p:spPr>
+        <p:txBody>
+          <a:bodyPr spcFirstLastPara="1" wrap="square" lIns="91425" tIns="45700" rIns="91425" bIns="45700" anchor="t" anchorCtr="0">
+            <a:noAutofit/>
+          </a:bodyPr>
+          <a:lstStyle/>
+          <a:p>
+            <a:pPr marL="0" lvl="0" indent="0" algn="l" rtl="0">
+              <a:spcBef>
+                <a:spcPts val="0"/>
+              </a:spcBef>
+              <a:spcAft>
+                <a:spcPts val="0"/>
+              </a:spcAft>
+              <a:buNone/>
+            </a:pPr>
+            <a:endParaRPr/>
+          </a:p>
+        </p:txBody>
+      </p:sp>
+      <p:sp>
+        <p:nvSpPr>
+          <p:cNvPr id="514" name="Google Shape;514;g270158642d6_0_591:notes"/>
+          <p:cNvSpPr txBox="1">
+            <a:spLocks noGrp="1"/>
+          </p:cNvSpPr>
+          <p:nvPr>
+            <p:ph type="sldNum" idx="12"/>
+          </p:nvPr>
+        </p:nvSpPr>
+        <p:spPr>
+          <a:xfrm>
+            <a:off x="3884613" y="8685213"/>
+            <a:ext cx="2971800" cy="458700"/>
+          </a:xfrm>
+          <a:prstGeom prst="rect">
+            <a:avLst/>
+          </a:prstGeom>
+        </p:spPr>
+        <p:txBody>
+          <a:bodyPr spcFirstLastPara="1" wrap="square" lIns="91425" tIns="45700" rIns="91425" bIns="45700" anchor="b" anchorCtr="0">
+            <a:noAutofit/>
+          </a:bodyPr>
+          <a:lstStyle/>
+          <a:p>
+            <a:pPr marL="0" lvl="0" indent="0" algn="r" rtl="0">
+              <a:spcBef>
+                <a:spcPts val="0"/>
+              </a:spcBef>
+              <a:spcAft>
+                <a:spcPts val="0"/>
+              </a:spcAft>
+              <a:buClr>
+                <a:srgbClr val="000000"/>
+              </a:buClr>
+              <a:buFont typeface="Arial"/>
+              <a:buNone/>
+            </a:pPr>
+            <a:fld id="{00000000-1234-1234-1234-123412341234}" type="slidenum">
+              <a:rPr lang="en-US"/>
+              <a:t>29</a:t>
+            </a:fld>
+            <a:endParaRPr/>
+          </a:p>
+        </p:txBody>
+      </p:sp>
+    </p:spTree>
+  </p:cSld>
+  <p:clrMapOvr>
+    <a:masterClrMapping/>
+  </p:clrMapOvr>
+</p:notes>
+</file>
+
 <file path=ppt/slideLayouts/slideLayout1.xml><?xml version="1.0" encoding="utf-8"?>
 <p:sldLayout xmlns:a="http://schemas.openxmlformats.org/drawingml/2006/main" xmlns:r="http://schemas.openxmlformats.org/officeDocument/2006/relationships" xmlns:p="http://schemas.openxmlformats.org/presentationml/2006/main" showMasterSp="0" preserve="1" userDrawn="1">
   <p:cSld name="Title Blue A">
@@ -961,7 +1111,7 @@
           </a:ln>
           <a:extLst>
             <a:ext uri="{C572A759-6A51-4108-AA02-DFA0A04FC94B}">
-              <ma14:wrappingTextBoxFlag xmlns:ma14="http://schemas.microsoft.com/office/mac/drawingml/2011/main" xmlns:a14="http://schemas.microsoft.com/office/drawing/2010/main" xmlns:m="http://schemas.openxmlformats.org/officeDocument/2006/math" xmlns="" val="1"/>
+              <ma14:wrappingTextBoxFlag xmlns="" xmlns:m="http://schemas.openxmlformats.org/officeDocument/2006/math" xmlns:a14="http://schemas.microsoft.com/office/drawing/2010/main" xmlns:ma14="http://schemas.microsoft.com/office/mac/drawingml/2011/main" val="1"/>
             </a:ext>
           </a:extLst>
         </p:spPr>
@@ -1193,7 +1343,7 @@
           </a:ln>
           <a:extLst>
             <a:ext uri="{C572A759-6A51-4108-AA02-DFA0A04FC94B}">
-              <ma14:wrappingTextBoxFlag xmlns:ma14="http://schemas.microsoft.com/office/mac/drawingml/2011/main" xmlns:a14="http://schemas.microsoft.com/office/drawing/2010/main" xmlns:m="http://schemas.openxmlformats.org/officeDocument/2006/math" xmlns="" val="1"/>
+              <ma14:wrappingTextBoxFlag xmlns="" xmlns:m="http://schemas.openxmlformats.org/officeDocument/2006/math" xmlns:a14="http://schemas.microsoft.com/office/drawing/2010/main" xmlns:ma14="http://schemas.microsoft.com/office/mac/drawingml/2011/main" val="1"/>
             </a:ext>
           </a:extLst>
         </p:spPr>
@@ -1436,7 +1586,7 @@
           </a:ln>
           <a:extLst>
             <a:ext uri="{C572A759-6A51-4108-AA02-DFA0A04FC94B}">
-              <ma14:wrappingTextBoxFlag xmlns:ma14="http://schemas.microsoft.com/office/mac/drawingml/2011/main" xmlns:a14="http://schemas.microsoft.com/office/drawing/2010/main" xmlns:m="http://schemas.openxmlformats.org/officeDocument/2006/math" xmlns="" val="1"/>
+              <ma14:wrappingTextBoxFlag xmlns="" xmlns:m="http://schemas.openxmlformats.org/officeDocument/2006/math" xmlns:a14="http://schemas.microsoft.com/office/drawing/2010/main" xmlns:ma14="http://schemas.microsoft.com/office/mac/drawingml/2011/main" val="1"/>
             </a:ext>
           </a:extLst>
         </p:spPr>
@@ -1532,7 +1682,7 @@
           </a:ln>
           <a:extLst>
             <a:ext uri="{C572A759-6A51-4108-AA02-DFA0A04FC94B}">
-              <ma14:wrappingTextBoxFlag xmlns:ma14="http://schemas.microsoft.com/office/mac/drawingml/2011/main" xmlns:a14="http://schemas.microsoft.com/office/drawing/2010/main" xmlns:m="http://schemas.openxmlformats.org/officeDocument/2006/math" xmlns="" val="1"/>
+              <ma14:wrappingTextBoxFlag xmlns="" xmlns:m="http://schemas.openxmlformats.org/officeDocument/2006/math" xmlns:a14="http://schemas.microsoft.com/office/drawing/2010/main" xmlns:ma14="http://schemas.microsoft.com/office/mac/drawingml/2011/main" val="1"/>
             </a:ext>
           </a:extLst>
         </p:spPr>
@@ -1970,7 +2120,7 @@
           </a:ln>
           <a:extLst>
             <a:ext uri="{C572A759-6A51-4108-AA02-DFA0A04FC94B}">
-              <ma14:wrappingTextBoxFlag xmlns:ma14="http://schemas.microsoft.com/office/mac/drawingml/2011/main" xmlns:a14="http://schemas.microsoft.com/office/drawing/2010/main" xmlns:m="http://schemas.openxmlformats.org/officeDocument/2006/math" xmlns="" val="1"/>
+              <ma14:wrappingTextBoxFlag xmlns="" xmlns:m="http://schemas.openxmlformats.org/officeDocument/2006/math" xmlns:a14="http://schemas.microsoft.com/office/drawing/2010/main" xmlns:ma14="http://schemas.microsoft.com/office/mac/drawingml/2011/main" val="1"/>
             </a:ext>
           </a:extLst>
         </p:spPr>
@@ -2351,7 +2501,7 @@
           </a:ln>
           <a:extLst>
             <a:ext uri="{C572A759-6A51-4108-AA02-DFA0A04FC94B}">
-              <ma14:wrappingTextBoxFlag xmlns:ma14="http://schemas.microsoft.com/office/mac/drawingml/2011/main" xmlns:a14="http://schemas.microsoft.com/office/drawing/2010/main" xmlns:m="http://schemas.openxmlformats.org/officeDocument/2006/math" xmlns="" val="1"/>
+              <ma14:wrappingTextBoxFlag xmlns="" xmlns:m="http://schemas.openxmlformats.org/officeDocument/2006/math" xmlns:a14="http://schemas.microsoft.com/office/drawing/2010/main" xmlns:ma14="http://schemas.microsoft.com/office/mac/drawingml/2011/main" val="1"/>
             </a:ext>
           </a:extLst>
         </p:spPr>
@@ -2801,7 +2951,7 @@
           </a:ln>
           <a:extLst>
             <a:ext uri="{C572A759-6A51-4108-AA02-DFA0A04FC94B}">
-              <ma14:wrappingTextBoxFlag xmlns:ma14="http://schemas.microsoft.com/office/mac/drawingml/2011/main" xmlns:a14="http://schemas.microsoft.com/office/drawing/2010/main" xmlns:m="http://schemas.openxmlformats.org/officeDocument/2006/math" xmlns="" val="1"/>
+              <ma14:wrappingTextBoxFlag xmlns="" xmlns:m="http://schemas.openxmlformats.org/officeDocument/2006/math" xmlns:a14="http://schemas.microsoft.com/office/drawing/2010/main" xmlns:ma14="http://schemas.microsoft.com/office/mac/drawingml/2011/main" val="1"/>
             </a:ext>
           </a:extLst>
         </p:spPr>
@@ -3460,7 +3610,7 @@
           </a:ln>
           <a:extLst>
             <a:ext uri="{C572A759-6A51-4108-AA02-DFA0A04FC94B}">
-              <ma14:wrappingTextBoxFlag xmlns:ma14="http://schemas.microsoft.com/office/mac/drawingml/2011/main" xmlns:a14="http://schemas.microsoft.com/office/drawing/2010/main" xmlns:m="http://schemas.openxmlformats.org/officeDocument/2006/math" xmlns="" val="1"/>
+              <ma14:wrappingTextBoxFlag xmlns="" xmlns:m="http://schemas.openxmlformats.org/officeDocument/2006/math" xmlns:a14="http://schemas.microsoft.com/office/drawing/2010/main" xmlns:ma14="http://schemas.microsoft.com/office/mac/drawingml/2011/main" val="1"/>
             </a:ext>
           </a:extLst>
         </p:spPr>
@@ -4164,7 +4314,7 @@
           </a:ln>
           <a:extLst>
             <a:ext uri="{C572A759-6A51-4108-AA02-DFA0A04FC94B}">
-              <ma14:wrappingTextBoxFlag xmlns:ma14="http://schemas.microsoft.com/office/mac/drawingml/2011/main" xmlns:a14="http://schemas.microsoft.com/office/drawing/2010/main" xmlns:m="http://schemas.openxmlformats.org/officeDocument/2006/math" xmlns="" val="1"/>
+              <ma14:wrappingTextBoxFlag xmlns="" xmlns:m="http://schemas.openxmlformats.org/officeDocument/2006/math" xmlns:a14="http://schemas.microsoft.com/office/drawing/2010/main" xmlns:ma14="http://schemas.microsoft.com/office/mac/drawingml/2011/main" val="1"/>
             </a:ext>
           </a:extLst>
         </p:spPr>
@@ -4876,7 +5026,7 @@
           </a:ln>
           <a:extLst>
             <a:ext uri="{C572A759-6A51-4108-AA02-DFA0A04FC94B}">
-              <ma14:wrappingTextBoxFlag xmlns:ma14="http://schemas.microsoft.com/office/mac/drawingml/2011/main" xmlns:a14="http://schemas.microsoft.com/office/drawing/2010/main" xmlns:m="http://schemas.openxmlformats.org/officeDocument/2006/math" xmlns="" val="1"/>
+              <ma14:wrappingTextBoxFlag xmlns="" xmlns:m="http://schemas.openxmlformats.org/officeDocument/2006/math" xmlns:a14="http://schemas.microsoft.com/office/drawing/2010/main" xmlns:ma14="http://schemas.microsoft.com/office/mac/drawingml/2011/main" val="1"/>
             </a:ext>
           </a:extLst>
         </p:spPr>
@@ -5655,7 +5805,7 @@
           </a:ln>
           <a:extLst>
             <a:ext uri="{C572A759-6A51-4108-AA02-DFA0A04FC94B}">
-              <ma14:wrappingTextBoxFlag xmlns:ma14="http://schemas.microsoft.com/office/mac/drawingml/2011/main" xmlns:a14="http://schemas.microsoft.com/office/drawing/2010/main" xmlns:m="http://schemas.openxmlformats.org/officeDocument/2006/math" xmlns="" val="1"/>
+              <ma14:wrappingTextBoxFlag xmlns="" xmlns:m="http://schemas.openxmlformats.org/officeDocument/2006/math" xmlns:a14="http://schemas.microsoft.com/office/drawing/2010/main" xmlns:ma14="http://schemas.microsoft.com/office/mac/drawingml/2011/main" val="1"/>
             </a:ext>
           </a:extLst>
         </p:spPr>
@@ -5856,7 +6006,7 @@
           </a:ln>
           <a:extLst>
             <a:ext uri="{C572A759-6A51-4108-AA02-DFA0A04FC94B}">
-              <ma14:wrappingTextBoxFlag xmlns:ma14="http://schemas.microsoft.com/office/mac/drawingml/2011/main" xmlns:a14="http://schemas.microsoft.com/office/drawing/2010/main" xmlns:m="http://schemas.openxmlformats.org/officeDocument/2006/math" xmlns="" val="1"/>
+              <ma14:wrappingTextBoxFlag xmlns="" xmlns:m="http://schemas.openxmlformats.org/officeDocument/2006/math" xmlns:a14="http://schemas.microsoft.com/office/drawing/2010/main" xmlns:ma14="http://schemas.microsoft.com/office/mac/drawingml/2011/main" val="1"/>
             </a:ext>
           </a:extLst>
         </p:spPr>
@@ -6267,7 +6417,7 @@
           </a:ln>
           <a:extLst>
             <a:ext uri="{C572A759-6A51-4108-AA02-DFA0A04FC94B}">
-              <ma14:wrappingTextBoxFlag xmlns:ma14="http://schemas.microsoft.com/office/mac/drawingml/2011/main" xmlns:a14="http://schemas.microsoft.com/office/drawing/2010/main" xmlns:m="http://schemas.openxmlformats.org/officeDocument/2006/math" xmlns="" val="1"/>
+              <ma14:wrappingTextBoxFlag xmlns="" xmlns:m="http://schemas.openxmlformats.org/officeDocument/2006/math" xmlns:a14="http://schemas.microsoft.com/office/drawing/2010/main" xmlns:ma14="http://schemas.microsoft.com/office/mac/drawingml/2011/main" val="1"/>
             </a:ext>
           </a:extLst>
         </p:spPr>
@@ -6632,7 +6782,7 @@
           </a:ln>
           <a:extLst>
             <a:ext uri="{C572A759-6A51-4108-AA02-DFA0A04FC94B}">
-              <ma14:wrappingTextBoxFlag xmlns:ma14="http://schemas.microsoft.com/office/mac/drawingml/2011/main" xmlns:a14="http://schemas.microsoft.com/office/drawing/2010/main" xmlns:m="http://schemas.openxmlformats.org/officeDocument/2006/math" xmlns="" val="1"/>
+              <ma14:wrappingTextBoxFlag xmlns="" xmlns:m="http://schemas.openxmlformats.org/officeDocument/2006/math" xmlns:a14="http://schemas.microsoft.com/office/drawing/2010/main" xmlns:ma14="http://schemas.microsoft.com/office/mac/drawingml/2011/main" val="1"/>
             </a:ext>
           </a:extLst>
         </p:spPr>
@@ -7320,7 +7470,7 @@
           </a:ln>
           <a:extLst>
             <a:ext uri="{C572A759-6A51-4108-AA02-DFA0A04FC94B}">
-              <ma14:wrappingTextBoxFlag xmlns:ma14="http://schemas.microsoft.com/office/mac/drawingml/2011/main" xmlns:a14="http://schemas.microsoft.com/office/drawing/2010/main" xmlns:m="http://schemas.openxmlformats.org/officeDocument/2006/math" xmlns="" val="1"/>
+              <ma14:wrappingTextBoxFlag xmlns="" xmlns:m="http://schemas.openxmlformats.org/officeDocument/2006/math" xmlns:a14="http://schemas.microsoft.com/office/drawing/2010/main" xmlns:ma14="http://schemas.microsoft.com/office/mac/drawingml/2011/main" val="1"/>
             </a:ext>
           </a:extLst>
         </p:spPr>
@@ -7879,7 +8029,7 @@
           </a:ln>
           <a:extLst>
             <a:ext uri="{C572A759-6A51-4108-AA02-DFA0A04FC94B}">
-              <ma14:wrappingTextBoxFlag xmlns:ma14="http://schemas.microsoft.com/office/mac/drawingml/2011/main" xmlns:a14="http://schemas.microsoft.com/office/drawing/2010/main" xmlns:m="http://schemas.openxmlformats.org/officeDocument/2006/math" xmlns="" val="1"/>
+              <ma14:wrappingTextBoxFlag xmlns="" xmlns:m="http://schemas.openxmlformats.org/officeDocument/2006/math" xmlns:a14="http://schemas.microsoft.com/office/drawing/2010/main" xmlns:ma14="http://schemas.microsoft.com/office/mac/drawingml/2011/main" val="1"/>
             </a:ext>
           </a:extLst>
         </p:spPr>
@@ -8503,7 +8653,7 @@
           </a:ln>
           <a:extLst>
             <a:ext uri="{C572A759-6A51-4108-AA02-DFA0A04FC94B}">
-              <ma14:wrappingTextBoxFlag xmlns:ma14="http://schemas.microsoft.com/office/mac/drawingml/2011/main" xmlns:a14="http://schemas.microsoft.com/office/drawing/2010/main" xmlns:m="http://schemas.openxmlformats.org/officeDocument/2006/math" xmlns="" val="1"/>
+              <ma14:wrappingTextBoxFlag xmlns="" xmlns:m="http://schemas.openxmlformats.org/officeDocument/2006/math" xmlns:a14="http://schemas.microsoft.com/office/drawing/2010/main" xmlns:ma14="http://schemas.microsoft.com/office/mac/drawingml/2011/main" val="1"/>
             </a:ext>
           </a:extLst>
         </p:spPr>
@@ -8965,7 +9115,7 @@
           </a:ln>
           <a:extLst>
             <a:ext uri="{C572A759-6A51-4108-AA02-DFA0A04FC94B}">
-              <ma14:wrappingTextBoxFlag xmlns:ma14="http://schemas.microsoft.com/office/mac/drawingml/2011/main" xmlns:a14="http://schemas.microsoft.com/office/drawing/2010/main" xmlns:m="http://schemas.openxmlformats.org/officeDocument/2006/math" xmlns="" val="1"/>
+              <ma14:wrappingTextBoxFlag xmlns="" xmlns:m="http://schemas.openxmlformats.org/officeDocument/2006/math" xmlns:a14="http://schemas.microsoft.com/office/drawing/2010/main" xmlns:ma14="http://schemas.microsoft.com/office/mac/drawingml/2011/main" val="1"/>
             </a:ext>
           </a:extLst>
         </p:spPr>
@@ -9177,6 +9327,403 @@
 </p:sldLayout>
 </file>
 
+<file path=ppt/slideLayouts/slideLayout27.xml><?xml version="1.0" encoding="utf-8"?>
+<p:sldLayout xmlns:a="http://schemas.openxmlformats.org/drawingml/2006/main" xmlns:r="http://schemas.openxmlformats.org/officeDocument/2006/relationships" xmlns:p="http://schemas.openxmlformats.org/presentationml/2006/main" matchingName="Title &amp; Content">
+  <p:cSld name="1_Title &amp; Content">
+    <p:spTree>
+      <p:nvGrpSpPr>
+        <p:cNvPr id="1" name="Shape 21"/>
+        <p:cNvGrpSpPr/>
+        <p:nvPr/>
+      </p:nvGrpSpPr>
+      <p:grpSpPr>
+        <a:xfrm>
+          <a:off x="0" y="0"/>
+          <a:ext cx="0" cy="0"/>
+          <a:chOff x="0" y="0"/>
+          <a:chExt cx="0" cy="0"/>
+        </a:xfrm>
+      </p:grpSpPr>
+      <p:sp>
+        <p:nvSpPr>
+          <p:cNvPr id="22" name="Google Shape;22;p16"/>
+          <p:cNvSpPr txBox="1">
+            <a:spLocks noGrp="1"/>
+          </p:cNvSpPr>
+          <p:nvPr>
+            <p:ph type="title"/>
+          </p:nvPr>
+        </p:nvSpPr>
+        <p:spPr>
+          <a:xfrm>
+            <a:off x="571370" y="571500"/>
+            <a:ext cx="11010816" cy="952499"/>
+          </a:xfrm>
+          <a:prstGeom prst="rect">
+            <a:avLst/>
+          </a:prstGeom>
+          <a:noFill/>
+          <a:ln>
+            <a:noFill/>
+          </a:ln>
+        </p:spPr>
+        <p:txBody>
+          <a:bodyPr spcFirstLastPara="1" wrap="square" lIns="0" tIns="0" rIns="0" bIns="0" anchor="ctr" anchorCtr="0">
+            <a:noAutofit/>
+          </a:bodyPr>
+          <a:lstStyle>
+            <a:lvl1pPr lvl="0" algn="l">
+              <a:lnSpc>
+                <a:spcPct val="90000"/>
+              </a:lnSpc>
+              <a:spcBef>
+                <a:spcPts val="0"/>
+              </a:spcBef>
+              <a:spcAft>
+                <a:spcPts val="0"/>
+              </a:spcAft>
+              <a:buClr>
+                <a:srgbClr val="525252"/>
+              </a:buClr>
+              <a:buSzPts val="4000"/>
+              <a:buFont typeface="Calibri"/>
+              <a:buNone/>
+              <a:defRPr sz="4000">
+                <a:solidFill>
+                  <a:srgbClr val="525252"/>
+                </a:solidFill>
+              </a:defRPr>
+            </a:lvl1pPr>
+            <a:lvl2pPr lvl="1" algn="l">
+              <a:lnSpc>
+                <a:spcPct val="100000"/>
+              </a:lnSpc>
+              <a:spcBef>
+                <a:spcPts val="0"/>
+              </a:spcBef>
+              <a:spcAft>
+                <a:spcPts val="0"/>
+              </a:spcAft>
+              <a:buSzPts val="1400"/>
+              <a:buNone/>
+              <a:defRPr/>
+            </a:lvl2pPr>
+            <a:lvl3pPr lvl="2" algn="l">
+              <a:lnSpc>
+                <a:spcPct val="100000"/>
+              </a:lnSpc>
+              <a:spcBef>
+                <a:spcPts val="0"/>
+              </a:spcBef>
+              <a:spcAft>
+                <a:spcPts val="0"/>
+              </a:spcAft>
+              <a:buSzPts val="1400"/>
+              <a:buNone/>
+              <a:defRPr/>
+            </a:lvl3pPr>
+            <a:lvl4pPr lvl="3" algn="l">
+              <a:lnSpc>
+                <a:spcPct val="100000"/>
+              </a:lnSpc>
+              <a:spcBef>
+                <a:spcPts val="0"/>
+              </a:spcBef>
+              <a:spcAft>
+                <a:spcPts val="0"/>
+              </a:spcAft>
+              <a:buSzPts val="1400"/>
+              <a:buNone/>
+              <a:defRPr/>
+            </a:lvl4pPr>
+            <a:lvl5pPr lvl="4" algn="l">
+              <a:lnSpc>
+                <a:spcPct val="100000"/>
+              </a:lnSpc>
+              <a:spcBef>
+                <a:spcPts val="0"/>
+              </a:spcBef>
+              <a:spcAft>
+                <a:spcPts val="0"/>
+              </a:spcAft>
+              <a:buSzPts val="1400"/>
+              <a:buNone/>
+              <a:defRPr/>
+            </a:lvl5pPr>
+            <a:lvl6pPr lvl="5" algn="l">
+              <a:lnSpc>
+                <a:spcPct val="100000"/>
+              </a:lnSpc>
+              <a:spcBef>
+                <a:spcPts val="0"/>
+              </a:spcBef>
+              <a:spcAft>
+                <a:spcPts val="0"/>
+              </a:spcAft>
+              <a:buSzPts val="1400"/>
+              <a:buNone/>
+              <a:defRPr/>
+            </a:lvl6pPr>
+            <a:lvl7pPr lvl="6" algn="l">
+              <a:lnSpc>
+                <a:spcPct val="100000"/>
+              </a:lnSpc>
+              <a:spcBef>
+                <a:spcPts val="0"/>
+              </a:spcBef>
+              <a:spcAft>
+                <a:spcPts val="0"/>
+              </a:spcAft>
+              <a:buSzPts val="1400"/>
+              <a:buNone/>
+              <a:defRPr/>
+            </a:lvl7pPr>
+            <a:lvl8pPr lvl="7" algn="l">
+              <a:lnSpc>
+                <a:spcPct val="100000"/>
+              </a:lnSpc>
+              <a:spcBef>
+                <a:spcPts val="0"/>
+              </a:spcBef>
+              <a:spcAft>
+                <a:spcPts val="0"/>
+              </a:spcAft>
+              <a:buSzPts val="1400"/>
+              <a:buNone/>
+              <a:defRPr/>
+            </a:lvl8pPr>
+            <a:lvl9pPr lvl="8" algn="l">
+              <a:lnSpc>
+                <a:spcPct val="100000"/>
+              </a:lnSpc>
+              <a:spcBef>
+                <a:spcPts val="0"/>
+              </a:spcBef>
+              <a:spcAft>
+                <a:spcPts val="0"/>
+              </a:spcAft>
+              <a:buSzPts val="1400"/>
+              <a:buNone/>
+              <a:defRPr/>
+            </a:lvl9pPr>
+          </a:lstStyle>
+          <a:p>
+            <a:endParaRPr/>
+          </a:p>
+        </p:txBody>
+      </p:sp>
+      <p:sp>
+        <p:nvSpPr>
+          <p:cNvPr id="23" name="Google Shape;23;p16"/>
+          <p:cNvSpPr txBox="1">
+            <a:spLocks noGrp="1"/>
+          </p:cNvSpPr>
+          <p:nvPr>
+            <p:ph type="body" idx="1"/>
+          </p:nvPr>
+        </p:nvSpPr>
+        <p:spPr>
+          <a:xfrm>
+            <a:off x="571370" y="1673454"/>
+            <a:ext cx="11010900" cy="4574947"/>
+          </a:xfrm>
+          <a:prstGeom prst="rect">
+            <a:avLst/>
+          </a:prstGeom>
+          <a:noFill/>
+          <a:ln>
+            <a:noFill/>
+          </a:ln>
+        </p:spPr>
+        <p:txBody>
+          <a:bodyPr spcFirstLastPara="1" wrap="square" lIns="91425" tIns="45700" rIns="91425" bIns="45700" anchor="t" anchorCtr="0">
+            <a:normAutofit/>
+          </a:bodyPr>
+          <a:lstStyle>
+            <a:lvl1pPr marL="457200" lvl="0" indent="-342900" algn="l">
+              <a:lnSpc>
+                <a:spcPct val="90000"/>
+              </a:lnSpc>
+              <a:spcBef>
+                <a:spcPts val="1000"/>
+              </a:spcBef>
+              <a:spcAft>
+                <a:spcPts val="0"/>
+              </a:spcAft>
+              <a:buClr>
+                <a:schemeClr val="dk1"/>
+              </a:buClr>
+              <a:buSzPts val="1800"/>
+              <a:buChar char="•"/>
+              <a:defRPr/>
+            </a:lvl1pPr>
+            <a:lvl2pPr marL="914400" lvl="1" indent="-342900" algn="l">
+              <a:lnSpc>
+                <a:spcPct val="90000"/>
+              </a:lnSpc>
+              <a:spcBef>
+                <a:spcPts val="500"/>
+              </a:spcBef>
+              <a:spcAft>
+                <a:spcPts val="0"/>
+              </a:spcAft>
+              <a:buClr>
+                <a:schemeClr val="dk1"/>
+              </a:buClr>
+              <a:buSzPts val="1800"/>
+              <a:buChar char="•"/>
+              <a:defRPr/>
+            </a:lvl2pPr>
+            <a:lvl3pPr marL="1371600" lvl="2" indent="-342900" algn="l">
+              <a:lnSpc>
+                <a:spcPct val="90000"/>
+              </a:lnSpc>
+              <a:spcBef>
+                <a:spcPts val="500"/>
+              </a:spcBef>
+              <a:spcAft>
+                <a:spcPts val="0"/>
+              </a:spcAft>
+              <a:buClr>
+                <a:schemeClr val="dk1"/>
+              </a:buClr>
+              <a:buSzPts val="1800"/>
+              <a:buChar char="•"/>
+              <a:defRPr/>
+            </a:lvl3pPr>
+            <a:lvl4pPr marL="1828800" lvl="3" indent="-342900" algn="l">
+              <a:lnSpc>
+                <a:spcPct val="90000"/>
+              </a:lnSpc>
+              <a:spcBef>
+                <a:spcPts val="500"/>
+              </a:spcBef>
+              <a:spcAft>
+                <a:spcPts val="0"/>
+              </a:spcAft>
+              <a:buClr>
+                <a:schemeClr val="dk1"/>
+              </a:buClr>
+              <a:buSzPts val="1800"/>
+              <a:buChar char="•"/>
+              <a:defRPr/>
+            </a:lvl4pPr>
+            <a:lvl5pPr marL="2286000" lvl="4" indent="-342900" algn="l">
+              <a:lnSpc>
+                <a:spcPct val="90000"/>
+              </a:lnSpc>
+              <a:spcBef>
+                <a:spcPts val="500"/>
+              </a:spcBef>
+              <a:spcAft>
+                <a:spcPts val="0"/>
+              </a:spcAft>
+              <a:buClr>
+                <a:schemeClr val="dk1"/>
+              </a:buClr>
+              <a:buSzPts val="1800"/>
+              <a:buChar char="•"/>
+              <a:defRPr/>
+            </a:lvl5pPr>
+            <a:lvl6pPr marL="2743200" lvl="5" indent="-342900" algn="l">
+              <a:lnSpc>
+                <a:spcPct val="90000"/>
+              </a:lnSpc>
+              <a:spcBef>
+                <a:spcPts val="500"/>
+              </a:spcBef>
+              <a:spcAft>
+                <a:spcPts val="0"/>
+              </a:spcAft>
+              <a:buClr>
+                <a:schemeClr val="dk1"/>
+              </a:buClr>
+              <a:buSzPts val="1800"/>
+              <a:buChar char="•"/>
+              <a:defRPr/>
+            </a:lvl6pPr>
+            <a:lvl7pPr marL="3200400" lvl="6" indent="-342900" algn="l">
+              <a:lnSpc>
+                <a:spcPct val="90000"/>
+              </a:lnSpc>
+              <a:spcBef>
+                <a:spcPts val="500"/>
+              </a:spcBef>
+              <a:spcAft>
+                <a:spcPts val="0"/>
+              </a:spcAft>
+              <a:buClr>
+                <a:schemeClr val="dk1"/>
+              </a:buClr>
+              <a:buSzPts val="1800"/>
+              <a:buChar char="•"/>
+              <a:defRPr/>
+            </a:lvl7pPr>
+            <a:lvl8pPr marL="3657600" lvl="7" indent="-342900" algn="l">
+              <a:lnSpc>
+                <a:spcPct val="90000"/>
+              </a:lnSpc>
+              <a:spcBef>
+                <a:spcPts val="500"/>
+              </a:spcBef>
+              <a:spcAft>
+                <a:spcPts val="0"/>
+              </a:spcAft>
+              <a:buClr>
+                <a:schemeClr val="dk1"/>
+              </a:buClr>
+              <a:buSzPts val="1800"/>
+              <a:buChar char="•"/>
+              <a:defRPr/>
+            </a:lvl8pPr>
+            <a:lvl9pPr marL="4114800" lvl="8" indent="-342900" algn="l">
+              <a:lnSpc>
+                <a:spcPct val="90000"/>
+              </a:lnSpc>
+              <a:spcBef>
+                <a:spcPts val="500"/>
+              </a:spcBef>
+              <a:spcAft>
+                <a:spcPts val="0"/>
+              </a:spcAft>
+              <a:buClr>
+                <a:schemeClr val="dk1"/>
+              </a:buClr>
+              <a:buSzPts val="1800"/>
+              <a:buChar char="•"/>
+              <a:defRPr/>
+            </a:lvl9pPr>
+          </a:lstStyle>
+          <a:p>
+            <a:endParaRPr/>
+          </a:p>
+        </p:txBody>
+      </p:sp>
+    </p:spTree>
+    <p:extLst>
+      <p:ext uri="{BB962C8B-B14F-4D97-AF65-F5344CB8AC3E}">
+        <p14:creationId xmlns:p14="http://schemas.microsoft.com/office/powerpoint/2010/main" val="50383132"/>
+      </p:ext>
+    </p:extLst>
+  </p:cSld>
+  <p:clrMapOvr>
+    <a:masterClrMapping/>
+  </p:clrMapOvr>
+  <mc:AlternateContent xmlns:mc="http://schemas.openxmlformats.org/markup-compatibility/2006" xmlns:p14="http://schemas.microsoft.com/office/powerpoint/2010/main">
+    <mc:Choice Requires="p14">
+      <p:transition spd="med" p14:dur="700">
+        <p:fade/>
+      </p:transition>
+    </mc:Choice>
+    <mc:Fallback xmlns:ahyp="http://schemas.microsoft.com/office/drawing/2018/hyperlinkcolor" xmlns:p15="http://schemas.microsoft.com/office/powerpoint/2012/main" xmlns:com="http://schemas.openxmlformats.org/drawingml/2006/compatibility" xmlns:pvml="urn:schemas-microsoft-com:office:powerpoint" xmlns:v="urn:schemas-microsoft-com:vml" xmlns:o="urn:schemas-microsoft-com:office:office" xmlns:dgm="http://schemas.openxmlformats.org/drawingml/2006/diagram" xmlns:c="http://schemas.openxmlformats.org/drawingml/2006/chart" xmlns:mv="urn:schemas-microsoft-com:mac:vml" xmlns="">
+      <p:transition spd="slow">
+        <p:fade/>
+      </p:transition>
+    </mc:Fallback>
+  </mc:AlternateContent>
+</p:sldLayout>
+</file>
+
 <file path=ppt/slideLayouts/slideLayout3.xml><?xml version="1.0" encoding="utf-8"?>
 <p:sldLayout xmlns:a="http://schemas.openxmlformats.org/drawingml/2006/main" xmlns:r="http://schemas.openxmlformats.org/officeDocument/2006/relationships" xmlns:p="http://schemas.openxmlformats.org/presentationml/2006/main" showMasterSp="0" preserve="1" userDrawn="1">
   <p:cSld name="Title White">
@@ -9271,7 +9818,7 @@
           </a:ln>
           <a:extLst>
             <a:ext uri="{C572A759-6A51-4108-AA02-DFA0A04FC94B}">
-              <ma14:wrappingTextBoxFlag xmlns="" xmlns:m="http://schemas.openxmlformats.org/officeDocument/2006/math" xmlns:a14="http://schemas.microsoft.com/office/drawing/2010/main" xmlns:ma14="http://schemas.microsoft.com/office/mac/drawingml/2011/main" val="1"/>
+              <ma14:wrappingTextBoxFlag xmlns:ma14="http://schemas.microsoft.com/office/mac/drawingml/2011/main" xmlns:a14="http://schemas.microsoft.com/office/drawing/2010/main" xmlns:m="http://schemas.openxmlformats.org/officeDocument/2006/math" xmlns="" val="1"/>
             </a:ext>
           </a:extLst>
         </p:spPr>
@@ -9662,7 +10209,7 @@
           </a:ln>
           <a:extLst>
             <a:ext uri="{C572A759-6A51-4108-AA02-DFA0A04FC94B}">
-              <ma14:wrappingTextBoxFlag xmlns:ma14="http://schemas.microsoft.com/office/mac/drawingml/2011/main" xmlns:a14="http://schemas.microsoft.com/office/drawing/2010/main" xmlns:m="http://schemas.openxmlformats.org/officeDocument/2006/math" xmlns="" val="1"/>
+              <ma14:wrappingTextBoxFlag xmlns="" xmlns:m="http://schemas.openxmlformats.org/officeDocument/2006/math" xmlns:a14="http://schemas.microsoft.com/office/drawing/2010/main" xmlns:ma14="http://schemas.microsoft.com/office/mac/drawingml/2011/main" val="1"/>
             </a:ext>
           </a:extLst>
         </p:spPr>
@@ -9758,7 +10305,7 @@
           </a:ln>
           <a:extLst>
             <a:ext uri="{C572A759-6A51-4108-AA02-DFA0A04FC94B}">
-              <ma14:wrappingTextBoxFlag xmlns:ma14="http://schemas.microsoft.com/office/mac/drawingml/2011/main" xmlns:a14="http://schemas.microsoft.com/office/drawing/2010/main" xmlns:m="http://schemas.openxmlformats.org/officeDocument/2006/math" xmlns="" val="1"/>
+              <ma14:wrappingTextBoxFlag xmlns="" xmlns:m="http://schemas.openxmlformats.org/officeDocument/2006/math" xmlns:a14="http://schemas.microsoft.com/office/drawing/2010/main" xmlns:ma14="http://schemas.microsoft.com/office/mac/drawingml/2011/main" val="1"/>
             </a:ext>
           </a:extLst>
         </p:spPr>
@@ -9917,7 +10464,7 @@
           </a:ln>
           <a:extLst>
             <a:ext uri="{C572A759-6A51-4108-AA02-DFA0A04FC94B}">
-              <ma14:wrappingTextBoxFlag xmlns:ma14="http://schemas.microsoft.com/office/mac/drawingml/2011/main" xmlns:a14="http://schemas.microsoft.com/office/drawing/2010/main" xmlns:m="http://schemas.openxmlformats.org/officeDocument/2006/math" xmlns="" val="1"/>
+              <ma14:wrappingTextBoxFlag xmlns="" xmlns:m="http://schemas.openxmlformats.org/officeDocument/2006/math" xmlns:a14="http://schemas.microsoft.com/office/drawing/2010/main" xmlns:ma14="http://schemas.microsoft.com/office/mac/drawingml/2011/main" val="1"/>
             </a:ext>
           </a:extLst>
         </p:spPr>
@@ -10126,7 +10673,7 @@
           </a:ln>
           <a:extLst>
             <a:ext uri="{C572A759-6A51-4108-AA02-DFA0A04FC94B}">
-              <ma14:wrappingTextBoxFlag xmlns:ma14="http://schemas.microsoft.com/office/mac/drawingml/2011/main" xmlns:a14="http://schemas.microsoft.com/office/drawing/2010/main" xmlns:m="http://schemas.openxmlformats.org/officeDocument/2006/math" xmlns="" val="1"/>
+              <ma14:wrappingTextBoxFlag xmlns="" xmlns:m="http://schemas.openxmlformats.org/officeDocument/2006/math" xmlns:a14="http://schemas.microsoft.com/office/drawing/2010/main" xmlns:ma14="http://schemas.microsoft.com/office/mac/drawingml/2011/main" val="1"/>
             </a:ext>
           </a:extLst>
         </p:spPr>
@@ -10398,7 +10945,7 @@
           </a:ln>
           <a:extLst>
             <a:ext uri="{C572A759-6A51-4108-AA02-DFA0A04FC94B}">
-              <ma14:wrappingTextBoxFlag xmlns:ma14="http://schemas.microsoft.com/office/mac/drawingml/2011/main" xmlns:a14="http://schemas.microsoft.com/office/drawing/2010/main" xmlns:m="http://schemas.openxmlformats.org/officeDocument/2006/math" xmlns="" val="1"/>
+              <ma14:wrappingTextBoxFlag xmlns="" xmlns:m="http://schemas.openxmlformats.org/officeDocument/2006/math" xmlns:a14="http://schemas.microsoft.com/office/drawing/2010/main" xmlns:ma14="http://schemas.microsoft.com/office/mac/drawingml/2011/main" val="1"/>
             </a:ext>
           </a:extLst>
         </p:spPr>
@@ -10620,7 +11167,7 @@
           </a:ln>
           <a:extLst>
             <a:ext uri="{C572A759-6A51-4108-AA02-DFA0A04FC94B}">
-              <ma14:wrappingTextBoxFlag xmlns:ma14="http://schemas.microsoft.com/office/mac/drawingml/2011/main" xmlns:a14="http://schemas.microsoft.com/office/drawing/2010/main" xmlns:m="http://schemas.openxmlformats.org/officeDocument/2006/math" xmlns="" val="1"/>
+              <ma14:wrappingTextBoxFlag xmlns="" xmlns:m="http://schemas.openxmlformats.org/officeDocument/2006/math" xmlns:a14="http://schemas.microsoft.com/office/drawing/2010/main" xmlns:ma14="http://schemas.microsoft.com/office/mac/drawingml/2011/main" val="1"/>
             </a:ext>
           </a:extLst>
         </p:spPr>
@@ -10674,7 +11221,7 @@
           </a:ln>
           <a:extLst>
             <a:ext uri="{C572A759-6A51-4108-AA02-DFA0A04FC94B}">
-              <ma14:wrappingTextBoxFlag xmlns:ma14="http://schemas.microsoft.com/office/mac/drawingml/2011/main" xmlns:a14="http://schemas.microsoft.com/office/drawing/2010/main" xmlns:m="http://schemas.openxmlformats.org/officeDocument/2006/math" xmlns="" val="1"/>
+              <ma14:wrappingTextBoxFlag xmlns="" xmlns:m="http://schemas.openxmlformats.org/officeDocument/2006/math" xmlns:a14="http://schemas.microsoft.com/office/drawing/2010/main" xmlns:ma14="http://schemas.microsoft.com/office/mac/drawingml/2011/main" val="1"/>
             </a:ext>
           </a:extLst>
         </p:spPr>
@@ -10742,7 +11289,7 @@
           </a:ln>
           <a:extLst>
             <a:ext uri="{C572A759-6A51-4108-AA02-DFA0A04FC94B}">
-              <ma14:wrappingTextBoxFlag xmlns:ma14="http://schemas.microsoft.com/office/mac/drawingml/2011/main" xmlns:a14="http://schemas.microsoft.com/office/drawing/2010/main" xmlns:m="http://schemas.openxmlformats.org/officeDocument/2006/math" xmlns="" val="1"/>
+              <ma14:wrappingTextBoxFlag xmlns="" xmlns:m="http://schemas.openxmlformats.org/officeDocument/2006/math" xmlns:a14="http://schemas.microsoft.com/office/drawing/2010/main" xmlns:ma14="http://schemas.microsoft.com/office/mac/drawingml/2011/main" val="1"/>
             </a:ext>
           </a:extLst>
         </p:spPr>
@@ -11033,7 +11580,7 @@
           </a:ln>
           <a:extLst>
             <a:ext uri="{C572A759-6A51-4108-AA02-DFA0A04FC94B}">
-              <ma14:wrappingTextBoxFlag xmlns:ma14="http://schemas.microsoft.com/office/mac/drawingml/2011/main" xmlns:a14="http://schemas.microsoft.com/office/drawing/2010/main" xmlns:m="http://schemas.openxmlformats.org/officeDocument/2006/math" xmlns="" val="1"/>
+              <ma14:wrappingTextBoxFlag xmlns="" xmlns:m="http://schemas.openxmlformats.org/officeDocument/2006/math" xmlns:a14="http://schemas.microsoft.com/office/drawing/2010/main" xmlns:ma14="http://schemas.microsoft.com/office/mac/drawingml/2011/main" val="1"/>
             </a:ext>
           </a:extLst>
         </p:spPr>
@@ -11109,7 +11656,7 @@
           </a:ln>
           <a:extLst>
             <a:ext uri="{C572A759-6A51-4108-AA02-DFA0A04FC94B}">
-              <ma14:wrappingTextBoxFlag xmlns:ma14="http://schemas.microsoft.com/office/mac/drawingml/2011/main" xmlns:a14="http://schemas.microsoft.com/office/drawing/2010/main" xmlns:m="http://schemas.openxmlformats.org/officeDocument/2006/math" xmlns="" val="1"/>
+              <ma14:wrappingTextBoxFlag xmlns="" xmlns:m="http://schemas.openxmlformats.org/officeDocument/2006/math" xmlns:a14="http://schemas.microsoft.com/office/drawing/2010/main" xmlns:ma14="http://schemas.microsoft.com/office/mac/drawingml/2011/main" val="1"/>
             </a:ext>
           </a:extLst>
         </p:spPr>
@@ -11269,6 +11816,7 @@
     <p:sldLayoutId id="2147483780" r:id="rId24"/>
     <p:sldLayoutId id="2147483744" r:id="rId25"/>
     <p:sldLayoutId id="2147483750" r:id="rId26"/>
+    <p:sldLayoutId id="2147483781" r:id="rId27"/>
   </p:sldLayoutIdLst>
   <mc:AlternateContent xmlns:mc="http://schemas.openxmlformats.org/markup-compatibility/2006" xmlns:p14="http://schemas.microsoft.com/office/powerpoint/2010/main">
     <mc:Choice Requires="p14">
@@ -12416,7 +12964,7 @@
         </p:blipFill>
         <p:spPr>
           <a:xfrm>
-            <a:off x="571369" y="4213412"/>
+            <a:off x="571369" y="1317812"/>
             <a:ext cx="8880601" cy="2164975"/>
           </a:xfrm>
           <a:prstGeom prst="rect">
@@ -12453,7 +13001,7 @@
         </p:blipFill>
         <p:spPr bwMode="auto">
           <a:xfrm>
-            <a:off x="6779485" y="134468"/>
+            <a:off x="6208116" y="2106703"/>
             <a:ext cx="5412515" cy="4464425"/>
           </a:xfrm>
           <a:prstGeom prst="rect">
@@ -12620,7 +13168,7 @@
             <a:pPr lvl="2"/>
             <a:r>
               <a:rPr lang="en-US" sz="2000" dirty="0"/>
-              <a:t>Less portable, need more memory (need addresses), should be faster</a:t>
+              <a:t>Less portable, need more memory (need addresses), should be faster (need other compiler)</a:t>
             </a:r>
           </a:p>
           <a:p>
@@ -13598,7 +14146,18 @@
               </a:rPr>
               <a:t>https://codeconfessions.substack.com/p/cpython-dynamic-dispatch-internals</a:t>
             </a:r>
-            <a:endParaRPr lang="en-US" dirty="0"/>
+            <a:r>
+              <a:rPr lang="en-US" dirty="0"/>
+              <a:t> (</a:t>
+            </a:r>
+            <a:r>
+              <a:rPr lang="en-US" dirty="0" err="1"/>
+              <a:t>orig</a:t>
+            </a:r>
+            <a:r>
+              <a:rPr lang="en-US" dirty="0"/>
+              <a:t>)</a:t>
+            </a:r>
           </a:p>
         </p:txBody>
       </p:sp>
@@ -14449,7 +15008,7 @@
             </a:r>
             <a:r>
               <a:rPr lang="en-US" dirty="0"/>
-              <a:t> Russia 2022)</a:t>
+              <a:t> Weekend 2022)</a:t>
             </a:r>
           </a:p>
           <a:p>
@@ -15557,16 +16116,15 @@
             </a:r>
             <a:r>
               <a:rPr lang="en-US" sz="2000" dirty="0"/>
-              <a:t>” (born in 2019 at MSFT)</a:t>
+              <a:t>” (born in 2019 at Microsoft)</a:t>
             </a:r>
           </a:p>
           <a:p>
             <a:pPr lvl="1"/>
             <a:r>
-              <a:rPr lang="en-US" sz="2000"/>
+              <a:rPr lang="en-US" sz="2000" dirty="0"/>
               <a:t>Critical section C API</a:t>
             </a:r>
-            <a:endParaRPr lang="en-US" sz="2000" dirty="0"/>
           </a:p>
         </p:txBody>
       </p:sp>
@@ -15665,7 +16223,7 @@
           <a:p>
             <a:r>
               <a:rPr lang="en-US" dirty="0"/>
-              <a:t>Anthony Shaw (MSFT) “</a:t>
+              <a:t>Anthony Shaw (Microsoft) “</a:t>
             </a:r>
             <a:r>
               <a:rPr lang="en-US" dirty="0" err="1"/>
@@ -15911,94 +16469,108 @@
           </a:p>
           <a:p>
             <a:r>
-              <a:rPr lang="en-US" dirty="0" err="1"/>
-              <a:t>PyCon</a:t>
-            </a:r>
-            <a:r>
-              <a:rPr lang="en-US" dirty="0"/>
-              <a:t> US: </a:t>
+              <a:rPr lang="ru-RU" dirty="0">
+                <a:hlinkClick r:id="rId3"/>
+              </a:rPr>
+              <a:t>Лучший курс по </a:t>
             </a:r>
             <a:r>
               <a:rPr lang="en-US" dirty="0">
                 <a:hlinkClick r:id="rId3"/>
               </a:rPr>
-              <a:t>https://www.youtube.com/@PyConUS</a:t>
-            </a:r>
-            <a:endParaRPr lang="en-US" dirty="0"/>
+              <a:t>Python</a:t>
+            </a:r>
+            <a:r>
+              <a:rPr lang="en-US" dirty="0"/>
+              <a:t> (by Nikita Sobolev, in progress…)</a:t>
+            </a:r>
+          </a:p>
+          <a:p>
+            <a:endParaRPr lang="ru-RU" dirty="0"/>
           </a:p>
           <a:p>
             <a:r>
               <a:rPr lang="en-US" dirty="0" err="1"/>
-              <a:t>EuroPython</a:t>
-            </a:r>
-            <a:r>
-              <a:rPr lang="en-US" dirty="0"/>
-              <a:t>: </a:t>
+              <a:t>PyCon</a:t>
+            </a:r>
+            <a:r>
+              <a:rPr lang="en-US" dirty="0"/>
+              <a:t> US: </a:t>
             </a:r>
             <a:r>
               <a:rPr lang="en-US" dirty="0">
                 <a:hlinkClick r:id="rId4"/>
               </a:rPr>
-              <a:t>https://www.youtube.com/@EuroPythonConference</a:t>
+              <a:t>https://www.youtube.com/@PyConUS</a:t>
             </a:r>
             <a:endParaRPr lang="en-US" dirty="0"/>
           </a:p>
           <a:p>
             <a:r>
               <a:rPr lang="en-US" dirty="0" err="1"/>
-              <a:t>PyCon</a:t>
-            </a:r>
-            <a:r>
-              <a:rPr lang="en-US" dirty="0"/>
-              <a:t> Russia, Moscow Python, </a:t>
-            </a:r>
-            <a:r>
-              <a:rPr lang="en-US" dirty="0" err="1"/>
-              <a:t>PiterPy</a:t>
-            </a:r>
-            <a:r>
-              <a:rPr lang="en-US" dirty="0"/>
-              <a:t>, </a:t>
-            </a:r>
-            <a:r>
-              <a:rPr lang="en-US" dirty="0" err="1"/>
-              <a:t>EkbPy</a:t>
-            </a:r>
-            <a:r>
-              <a:rPr lang="en-US" dirty="0"/>
-              <a:t>, </a:t>
-            </a:r>
-            <a:r>
-              <a:rPr lang="en-US" dirty="0" err="1"/>
-              <a:t>Pytho_NN</a:t>
-            </a:r>
-            <a:r>
-              <a:rPr lang="en-US" dirty="0"/>
-              <a:t>, </a:t>
-            </a:r>
-            <a:r>
-              <a:rPr lang="en-US" dirty="0" err="1"/>
-              <a:t>Pytup</a:t>
-            </a:r>
-            <a:r>
-              <a:rPr lang="en-US" dirty="0"/>
-              <a:t>, ...</a:t>
-            </a:r>
-          </a:p>
-          <a:p>
-            <a:endParaRPr lang="en-US" dirty="0"/>
-          </a:p>
-          <a:p>
-            <a:r>
-              <a:rPr lang="en-US" dirty="0"/>
-              <a:t>LLVM Dev Meeting videos: </a:t>
+              <a:t>EuroPython</a:t>
+            </a:r>
+            <a:r>
+              <a:rPr lang="en-US" dirty="0"/>
+              <a:t>: </a:t>
             </a:r>
             <a:r>
               <a:rPr lang="en-US" dirty="0">
                 <a:hlinkClick r:id="rId5"/>
               </a:rPr>
-              <a:t>https://www.youtube.com/@LLVMPROJ</a:t>
-            </a:r>
+              <a:t>https://www.youtube.com/@EuroPythonConference</a:t>
+            </a:r>
+            <a:endParaRPr lang="en-US" dirty="0"/>
+          </a:p>
+          <a:p>
+            <a:r>
+              <a:rPr lang="en-US" dirty="0" err="1"/>
+              <a:t>PyCon</a:t>
+            </a:r>
+            <a:r>
+              <a:rPr lang="en-US" dirty="0"/>
+              <a:t> Russia, Moscow Python, </a:t>
+            </a:r>
+            <a:r>
+              <a:rPr lang="en-US" dirty="0" err="1"/>
+              <a:t>PiterPy</a:t>
+            </a:r>
+            <a:r>
+              <a:rPr lang="en-US" dirty="0"/>
+              <a:t>, </a:t>
+            </a:r>
+            <a:r>
+              <a:rPr lang="en-US" dirty="0" err="1"/>
+              <a:t>EkbPy</a:t>
+            </a:r>
+            <a:r>
+              <a:rPr lang="en-US" dirty="0"/>
+              <a:t>, </a:t>
+            </a:r>
+            <a:r>
+              <a:rPr lang="en-US" dirty="0">
+                <a:hlinkClick r:id="rId6"/>
+              </a:rPr>
+              <a:t>@Pytho_NN</a:t>
+            </a:r>
+            <a:r>
+              <a:rPr lang="en-US" dirty="0"/>
+              <a:t>, </a:t>
+            </a:r>
+            <a:r>
+              <a:rPr lang="en-US" dirty="0" err="1"/>
+              <a:t>Pytup</a:t>
+            </a:r>
+            <a:r>
+              <a:rPr lang="en-US" dirty="0"/>
+              <a:t>, ...</a:t>
+            </a:r>
+            <a:endParaRPr lang="ru-RU" dirty="0"/>
+          </a:p>
+          <a:p>
+            <a:pPr marL="0" indent="0">
+              <a:buNone/>
+            </a:pPr>
             <a:endParaRPr lang="en-US" dirty="0"/>
           </a:p>
         </p:txBody>
@@ -16047,10 +16619,10 @@
       </p:grpSpPr>
       <p:sp>
         <p:nvSpPr>
-          <p:cNvPr id="2" name="Заголовок 1">
+          <p:cNvPr id="2" name="Title 1">
             <a:extLst>
               <a:ext uri="{FF2B5EF4-FFF2-40B4-BE49-F238E27FC236}">
-                <a16:creationId xmlns:a16="http://schemas.microsoft.com/office/drawing/2014/main" id="{F4923D96-2192-7926-8503-801A95C59524}"/>
+                <a16:creationId xmlns:a16="http://schemas.microsoft.com/office/drawing/2014/main" id="{DB4E194C-529D-44DC-A6D7-9375F9655CDC}"/>
               </a:ext>
             </a:extLst>
           </p:cNvPr>
@@ -16068,18 +16640,17 @@
           <a:p>
             <a:r>
               <a:rPr lang="en-US" dirty="0"/>
-              <a:t>Lab assignment</a:t>
-            </a:r>
-            <a:endParaRPr lang="ru-RU" dirty="0"/>
+              <a:t>Next time…</a:t>
+            </a:r>
           </a:p>
         </p:txBody>
       </p:sp>
       <p:sp>
         <p:nvSpPr>
-          <p:cNvPr id="3" name="Объект 2">
+          <p:cNvPr id="3" name="Content Placeholder 2">
             <a:extLst>
               <a:ext uri="{FF2B5EF4-FFF2-40B4-BE49-F238E27FC236}">
-                <a16:creationId xmlns:a16="http://schemas.microsoft.com/office/drawing/2014/main" id="{1ECCD460-F424-F959-C347-14258749FA7E}"/>
+                <a16:creationId xmlns:a16="http://schemas.microsoft.com/office/drawing/2014/main" id="{0BFAD4B0-497A-4026-AC88-B9BEA12D38BF}"/>
               </a:ext>
             </a:extLst>
           </p:cNvPr>
@@ -16092,101 +16663,42 @@
         </p:nvSpPr>
         <p:spPr/>
         <p:txBody>
-          <a:bodyPr>
-            <a:normAutofit/>
-          </a:bodyPr>
+          <a:bodyPr/>
           <a:lstStyle/>
           <a:p>
             <a:r>
               <a:rPr lang="en-US" dirty="0"/>
-              <a:t>in lectures repository: </a:t>
-            </a:r>
-            <a:r>
-              <a:rPr lang="en-US" dirty="0">
-                <a:hlinkClick r:id="rId2"/>
-              </a:rPr>
-              <a:t>NN-</a:t>
-            </a:r>
-            <a:r>
-              <a:rPr lang="en-US" dirty="0" err="1">
-                <a:hlinkClick r:id="rId2"/>
-              </a:rPr>
-              <a:t>complr</a:t>
-            </a:r>
-            <a:r>
-              <a:rPr lang="en-US" dirty="0">
-                <a:hlinkClick r:id="rId2"/>
-              </a:rPr>
-              <a:t>-tech/</a:t>
-            </a:r>
-            <a:r>
-              <a:rPr lang="en-US" dirty="0" err="1">
-                <a:hlinkClick r:id="rId2"/>
-              </a:rPr>
-              <a:t>Complr</a:t>
-            </a:r>
-            <a:r>
-              <a:rPr lang="en-US" dirty="0">
-                <a:hlinkClick r:id="rId2"/>
-              </a:rPr>
-              <a:t>-course-lectures</a:t>
-            </a:r>
-            <a:endParaRPr lang="en-US" dirty="0"/>
-          </a:p>
-          <a:p>
-            <a:r>
-              <a:rPr lang="en-US" dirty="0"/>
-              <a:t>Folder: 10-Python-internals-code-snippets</a:t>
-            </a:r>
-          </a:p>
-          <a:p>
-            <a:endParaRPr lang="en-US" dirty="0"/>
-          </a:p>
-          <a:p>
-            <a:r>
-              <a:rPr lang="en-US" dirty="0"/>
-              <a:t>Where to seek help</a:t>
-            </a:r>
-          </a:p>
-          <a:p>
-            <a:pPr lvl="1"/>
-            <a:r>
-              <a:rPr lang="en-US" dirty="0"/>
-              <a:t>Telegram: </a:t>
-            </a:r>
-            <a:r>
-              <a:rPr lang="en-US" dirty="0">
-                <a:hlinkClick r:id="rId3"/>
-              </a:rPr>
-              <a:t>@vasily_v_ryabov</a:t>
-            </a:r>
-            <a:r>
-              <a:rPr lang="en-US" dirty="0"/>
-              <a:t> (questions)</a:t>
-            </a:r>
-            <a:endParaRPr lang="ru-RU" dirty="0"/>
-          </a:p>
-          <a:p>
-            <a:pPr lvl="1"/>
-            <a:r>
-              <a:rPr lang="en-US" dirty="0"/>
-              <a:t>Email to </a:t>
-            </a:r>
-            <a:r>
-              <a:rPr lang="en-US" dirty="0">
-                <a:hlinkClick r:id="rId4"/>
-              </a:rPr>
-              <a:t>v</a:t>
-            </a:r>
-            <a:r>
-              <a:rPr lang="en-US" dirty="0">
-                <a:hlinkClick r:id="rId5"/>
-              </a:rPr>
-              <a:t>asily.v.ryabov@gmail.com</a:t>
-            </a:r>
-            <a:r>
-              <a:rPr lang="en-US" dirty="0"/>
-              <a:t> (send the code)</a:t>
+              <a:t>MLIR practice in 300 lines of code</a:t>
+            </a:r>
+          </a:p>
+          <a:p>
+            <a:r>
+              <a:rPr lang="en-US" dirty="0"/>
+              <a:t>Mojo</a:t>
+            </a:r>
+            <a:r>
+              <a:rPr lang="en-US" sz="2800" dirty="0"/>
+              <a:t>🔥 &amp; </a:t>
+            </a:r>
+            <a:r>
+              <a:rPr lang="en-US" sz="2800" dirty="0" err="1"/>
+              <a:t>clangIR</a:t>
+            </a:r>
+            <a:r>
+              <a:rPr lang="en-US" sz="2800" dirty="0"/>
+              <a:t> internals</a:t>
+            </a:r>
+          </a:p>
+          <a:p>
+            <a:r>
+              <a:rPr lang="en-US" dirty="0"/>
+              <a:t>Intro to exception handling</a:t>
+            </a:r>
+          </a:p>
+          <a:p>
+            <a:r>
+              <a:rPr lang="en-US" dirty="0"/>
+              <a:t>LLVM JIT engine (ORCv2) usage</a:t>
             </a:r>
           </a:p>
         </p:txBody>
@@ -16194,7 +16706,7 @@
     </p:spTree>
     <p:extLst>
       <p:ext uri="{BB962C8B-B14F-4D97-AF65-F5344CB8AC3E}">
-        <p14:creationId xmlns:p14="http://schemas.microsoft.com/office/powerpoint/2010/main" val="4196812156"/>
+        <p14:creationId xmlns:p14="http://schemas.microsoft.com/office/powerpoint/2010/main" val="947711350"/>
       </p:ext>
     </p:extLst>
   </p:cSld>
@@ -16235,10 +16747,10 @@
       </p:grpSpPr>
       <p:sp>
         <p:nvSpPr>
-          <p:cNvPr id="2" name="Title 1">
+          <p:cNvPr id="2" name="Заголовок 1">
             <a:extLst>
               <a:ext uri="{FF2B5EF4-FFF2-40B4-BE49-F238E27FC236}">
-                <a16:creationId xmlns:a16="http://schemas.microsoft.com/office/drawing/2014/main" id="{DB4E194C-529D-44DC-A6D7-9375F9655CDC}"/>
+                <a16:creationId xmlns:a16="http://schemas.microsoft.com/office/drawing/2014/main" id="{F4923D96-2192-7926-8503-801A95C59524}"/>
               </a:ext>
             </a:extLst>
           </p:cNvPr>
@@ -16256,17 +16768,18 @@
           <a:p>
             <a:r>
               <a:rPr lang="en-US" dirty="0"/>
-              <a:t>Next time…</a:t>
-            </a:r>
+              <a:t>No lab assignment</a:t>
+            </a:r>
+            <a:endParaRPr lang="ru-RU" dirty="0"/>
           </a:p>
         </p:txBody>
       </p:sp>
       <p:sp>
         <p:nvSpPr>
-          <p:cNvPr id="3" name="Content Placeholder 2">
+          <p:cNvPr id="3" name="Объект 2">
             <a:extLst>
               <a:ext uri="{FF2B5EF4-FFF2-40B4-BE49-F238E27FC236}">
-                <a16:creationId xmlns:a16="http://schemas.microsoft.com/office/drawing/2014/main" id="{0BFAD4B0-497A-4026-AC88-B9BEA12D38BF}"/>
+                <a16:creationId xmlns:a16="http://schemas.microsoft.com/office/drawing/2014/main" id="{1ECCD460-F424-F959-C347-14258749FA7E}"/>
               </a:ext>
             </a:extLst>
           </p:cNvPr>
@@ -16279,20 +16792,45 @@
         </p:nvSpPr>
         <p:spPr/>
         <p:txBody>
-          <a:bodyPr/>
+          <a:bodyPr>
+            <a:normAutofit/>
+          </a:bodyPr>
           <a:lstStyle/>
           <a:p>
-            <a:r>
-              <a:rPr lang="en-US" dirty="0"/>
-              <a:t>MLIR overview + LLVM JIT engine (ORCv2)</a:t>
-            </a:r>
+            <a:endParaRPr lang="en-US" dirty="0"/>
+          </a:p>
+          <a:p>
+            <a:r>
+              <a:rPr lang="en-US" dirty="0"/>
+              <a:t>Where to ask questions</a:t>
+            </a:r>
+          </a:p>
+          <a:p>
+            <a:pPr lvl="1"/>
+            <a:r>
+              <a:rPr lang="en-US" dirty="0"/>
+              <a:t>Telegram: </a:t>
+            </a:r>
+            <a:r>
+              <a:rPr lang="en-US" dirty="0">
+                <a:hlinkClick r:id="rId2"/>
+              </a:rPr>
+              <a:t>@vasily_v_ryabov</a:t>
+            </a:r>
+            <a:r>
+              <a:rPr lang="en-US" dirty="0"/>
+              <a:t> (questions)</a:t>
+            </a:r>
+          </a:p>
+          <a:p>
+            <a:endParaRPr lang="en-US" dirty="0"/>
           </a:p>
         </p:txBody>
       </p:sp>
     </p:spTree>
     <p:extLst>
       <p:ext uri="{BB962C8B-B14F-4D97-AF65-F5344CB8AC3E}">
-        <p14:creationId xmlns:p14="http://schemas.microsoft.com/office/powerpoint/2010/main" val="947711350"/>
+        <p14:creationId xmlns:p14="http://schemas.microsoft.com/office/powerpoint/2010/main" val="4196812156"/>
       </p:ext>
     </p:extLst>
   </p:cSld>
@@ -16319,7 +16857,7 @@
   <p:cSld>
     <p:spTree>
       <p:nvGrpSpPr>
-        <p:cNvPr id="1" name=""/>
+        <p:cNvPr id="1" name="Shape 515"/>
         <p:cNvGrpSpPr/>
         <p:nvPr/>
       </p:nvGrpSpPr>
@@ -16331,28 +16869,334 @@
           <a:chExt cx="0" cy="0"/>
         </a:xfrm>
       </p:grpSpPr>
+      <p:sp>
+        <p:nvSpPr>
+          <p:cNvPr id="516" name="Google Shape;516;g270158642d6_0_591"/>
+          <p:cNvSpPr txBox="1">
+            <a:spLocks noGrp="1"/>
+          </p:cNvSpPr>
+          <p:nvPr>
+            <p:ph type="title"/>
+          </p:nvPr>
+        </p:nvSpPr>
+        <p:spPr>
+          <a:xfrm>
+            <a:off x="571370" y="571500"/>
+            <a:ext cx="11010900" cy="952500"/>
+          </a:xfrm>
+          <a:prstGeom prst="rect">
+            <a:avLst/>
+          </a:prstGeom>
+        </p:spPr>
+        <p:txBody>
+          <a:bodyPr spcFirstLastPara="1" wrap="square" lIns="0" tIns="0" rIns="0" bIns="0" anchor="ctr" anchorCtr="0">
+            <a:noAutofit/>
+          </a:bodyPr>
+          <a:lstStyle/>
+          <a:p>
+            <a:pPr marL="0" lvl="0" indent="0" algn="l" rtl="0">
+              <a:spcBef>
+                <a:spcPts val="0"/>
+              </a:spcBef>
+              <a:spcAft>
+                <a:spcPts val="0"/>
+              </a:spcAft>
+              <a:buNone/>
+            </a:pPr>
+            <a:r>
+              <a:rPr lang="en-US"/>
+              <a:t>Test</a:t>
+            </a:r>
+            <a:endParaRPr/>
+          </a:p>
+        </p:txBody>
+      </p:sp>
+      <p:sp>
+        <p:nvSpPr>
+          <p:cNvPr id="517" name="Google Shape;517;g270158642d6_0_591"/>
+          <p:cNvSpPr txBox="1"/>
+          <p:nvPr/>
+        </p:nvSpPr>
+        <p:spPr>
+          <a:xfrm>
+            <a:off x="571375" y="1673451"/>
+            <a:ext cx="11010900" cy="2911800"/>
+          </a:xfrm>
+          <a:prstGeom prst="rect">
+            <a:avLst/>
+          </a:prstGeom>
+          <a:noFill/>
+          <a:ln>
+            <a:noFill/>
+          </a:ln>
+        </p:spPr>
+        <p:txBody>
+          <a:bodyPr spcFirstLastPara="1" wrap="square" lIns="91425" tIns="45700" rIns="91425" bIns="45700" anchor="t" anchorCtr="0">
+            <a:normAutofit/>
+          </a:bodyPr>
+          <a:lstStyle/>
+          <a:p>
+            <a:pPr marL="0" lvl="0" indent="0" algn="l" rtl="0">
+              <a:lnSpc>
+                <a:spcPct val="90000"/>
+              </a:lnSpc>
+              <a:spcBef>
+                <a:spcPts val="1000"/>
+              </a:spcBef>
+              <a:spcAft>
+                <a:spcPts val="0"/>
+              </a:spcAft>
+              <a:buNone/>
+            </a:pPr>
+            <a:r>
+              <a:rPr lang="en-US" sz="2800" dirty="0">
+                <a:latin typeface="Calibri"/>
+                <a:ea typeface="Calibri"/>
+                <a:cs typeface="Calibri"/>
+                <a:sym typeface="Calibri"/>
+                <a:hlinkClick r:id="rId3"/>
+              </a:rPr>
+              <a:t>https://forms.gle/eNpQzdsvN99S7byY6</a:t>
+            </a:r>
+            <a:r>
+              <a:rPr lang="en-US" sz="2800" dirty="0">
+                <a:latin typeface="Calibri"/>
+                <a:ea typeface="Calibri"/>
+                <a:cs typeface="Calibri"/>
+                <a:sym typeface="Calibri"/>
+              </a:rPr>
+              <a:t> </a:t>
+            </a:r>
+            <a:endParaRPr sz="2800" dirty="0">
+              <a:solidFill>
+                <a:srgbClr val="000000"/>
+              </a:solidFill>
+              <a:latin typeface="Calibri"/>
+              <a:ea typeface="Calibri"/>
+              <a:cs typeface="Calibri"/>
+              <a:sym typeface="Calibri"/>
+            </a:endParaRPr>
+          </a:p>
+          <a:p>
+            <a:pPr marL="0" lvl="0" indent="0" algn="l" rtl="0">
+              <a:lnSpc>
+                <a:spcPct val="90000"/>
+              </a:lnSpc>
+              <a:spcBef>
+                <a:spcPts val="1000"/>
+              </a:spcBef>
+              <a:spcAft>
+                <a:spcPts val="0"/>
+              </a:spcAft>
+              <a:buNone/>
+            </a:pPr>
+            <a:r>
+              <a:rPr lang="en-US" sz="2800" dirty="0">
+                <a:solidFill>
+                  <a:srgbClr val="000000"/>
+                </a:solidFill>
+                <a:latin typeface="Calibri"/>
+                <a:ea typeface="Calibri"/>
+                <a:cs typeface="Calibri"/>
+                <a:sym typeface="Calibri"/>
+              </a:rPr>
+              <a:t>Submission time: </a:t>
+            </a:r>
+            <a:r>
+              <a:rPr lang="en-US" sz="2800" b="1" dirty="0">
+                <a:solidFill>
+                  <a:srgbClr val="000000"/>
+                </a:solidFill>
+                <a:latin typeface="Calibri"/>
+                <a:ea typeface="Calibri"/>
+                <a:cs typeface="Calibri"/>
+                <a:sym typeface="Calibri"/>
+              </a:rPr>
+              <a:t>1</a:t>
+            </a:r>
+            <a:r>
+              <a:rPr lang="en-US" sz="2800" b="1" dirty="0">
+                <a:latin typeface="Calibri"/>
+                <a:ea typeface="Calibri"/>
+                <a:cs typeface="Calibri"/>
+                <a:sym typeface="Calibri"/>
+              </a:rPr>
+              <a:t>0</a:t>
+            </a:r>
+            <a:r>
+              <a:rPr lang="en-US" sz="2800" b="1" dirty="0">
+                <a:solidFill>
+                  <a:srgbClr val="000000"/>
+                </a:solidFill>
+                <a:latin typeface="Calibri"/>
+                <a:ea typeface="Calibri"/>
+                <a:cs typeface="Calibri"/>
+                <a:sym typeface="Calibri"/>
+              </a:rPr>
+              <a:t> minutes</a:t>
+            </a:r>
+            <a:r>
+              <a:rPr lang="en-US" sz="2800" dirty="0">
+                <a:solidFill>
+                  <a:srgbClr val="000000"/>
+                </a:solidFill>
+                <a:latin typeface="Calibri"/>
+                <a:ea typeface="Calibri"/>
+                <a:cs typeface="Calibri"/>
+                <a:sym typeface="Calibri"/>
+              </a:rPr>
+              <a:t> </a:t>
+            </a:r>
+            <a:endParaRPr sz="2800" dirty="0">
+              <a:solidFill>
+                <a:srgbClr val="000000"/>
+              </a:solidFill>
+              <a:latin typeface="Calibri"/>
+              <a:ea typeface="Calibri"/>
+              <a:cs typeface="Calibri"/>
+              <a:sym typeface="Calibri"/>
+            </a:endParaRPr>
+          </a:p>
+        </p:txBody>
+      </p:sp>
+      <p:pic>
+        <p:nvPicPr>
+          <p:cNvPr id="3" name="Picture 2">
+            <a:extLst>
+              <a:ext uri="{FF2B5EF4-FFF2-40B4-BE49-F238E27FC236}">
+                <a16:creationId xmlns:a16="http://schemas.microsoft.com/office/drawing/2014/main" id="{7955C818-1E77-7F08-2831-EAE7D013725E}"/>
+              </a:ext>
+            </a:extLst>
+          </p:cNvPr>
+          <p:cNvPicPr>
+            <a:picLocks noChangeAspect="1"/>
+          </p:cNvPicPr>
+          <p:nvPr/>
+        </p:nvPicPr>
+        <p:blipFill>
+          <a:blip r:embed="rId4"/>
+          <a:stretch>
+            <a:fillRect/>
+          </a:stretch>
+        </p:blipFill>
+        <p:spPr>
+          <a:xfrm>
+            <a:off x="571369" y="3129351"/>
+            <a:ext cx="7854927" cy="2312225"/>
+          </a:xfrm>
+          <a:prstGeom prst="rect">
+            <a:avLst/>
+          </a:prstGeom>
+        </p:spPr>
+      </p:pic>
+      <p:sp>
+        <p:nvSpPr>
+          <p:cNvPr id="4" name="Google Shape;518;g270158642d6_0_591">
+            <a:extLst>
+              <a:ext uri="{FF2B5EF4-FFF2-40B4-BE49-F238E27FC236}">
+                <a16:creationId xmlns:a16="http://schemas.microsoft.com/office/drawing/2014/main" id="{942B6C56-2F9D-7371-9C26-29095532269E}"/>
+              </a:ext>
+            </a:extLst>
+          </p:cNvPr>
+          <p:cNvSpPr txBox="1"/>
+          <p:nvPr/>
+        </p:nvSpPr>
+        <p:spPr>
+          <a:xfrm>
+            <a:off x="7763435" y="6397900"/>
+            <a:ext cx="4103415" cy="461635"/>
+          </a:xfrm>
+          <a:prstGeom prst="rect">
+            <a:avLst/>
+          </a:prstGeom>
+          <a:noFill/>
+          <a:ln>
+            <a:noFill/>
+          </a:ln>
+        </p:spPr>
+        <p:txBody>
+          <a:bodyPr spcFirstLastPara="1" wrap="square" lIns="91425" tIns="91425" rIns="91425" bIns="91425" anchor="t" anchorCtr="0">
+            <a:spAutoFit/>
+          </a:bodyPr>
+          <a:lstStyle/>
+          <a:p>
+            <a:pPr marL="0" lvl="0" indent="0" algn="l" rtl="0">
+              <a:spcBef>
+                <a:spcPts val="0"/>
+              </a:spcBef>
+              <a:spcAft>
+                <a:spcPts val="0"/>
+              </a:spcAft>
+              <a:buNone/>
+            </a:pPr>
+            <a:r>
+              <a:rPr lang="en-US" sz="2000" dirty="0">
+                <a:solidFill>
+                  <a:srgbClr val="525252"/>
+                </a:solidFill>
+              </a:rPr>
+              <a:t>Backup: </a:t>
+            </a:r>
+            <a:r>
+              <a:rPr lang="en-US" sz="2000" u="sng" dirty="0">
+                <a:solidFill>
+                  <a:srgbClr val="0068B5"/>
+                </a:solidFill>
+                <a:hlinkClick r:id="rId5"/>
+              </a:rPr>
+              <a:t>vasily.v.ryabov@gmail.com</a:t>
+            </a:r>
+            <a:r>
+              <a:rPr lang="en-US" sz="2000" dirty="0">
+                <a:solidFill>
+                  <a:srgbClr val="525252"/>
+                </a:solidFill>
+              </a:rPr>
+              <a:t> </a:t>
+            </a:r>
+            <a:endParaRPr sz="2000" dirty="0">
+              <a:solidFill>
+                <a:srgbClr val="525252"/>
+              </a:solidFill>
+            </a:endParaRPr>
+          </a:p>
+        </p:txBody>
+      </p:sp>
+      <p:pic>
+        <p:nvPicPr>
+          <p:cNvPr id="8" name="Picture 7">
+            <a:extLst>
+              <a:ext uri="{FF2B5EF4-FFF2-40B4-BE49-F238E27FC236}">
+                <a16:creationId xmlns:a16="http://schemas.microsoft.com/office/drawing/2014/main" id="{96C8E925-7C40-BC39-A1FE-794CA73AEBCF}"/>
+              </a:ext>
+            </a:extLst>
+          </p:cNvPr>
+          <p:cNvPicPr>
+            <a:picLocks noChangeAspect="1"/>
+          </p:cNvPicPr>
+          <p:nvPr/>
+        </p:nvPicPr>
+        <p:blipFill>
+          <a:blip r:embed="rId6"/>
+          <a:stretch>
+            <a:fillRect/>
+          </a:stretch>
+        </p:blipFill>
+        <p:spPr>
+          <a:xfrm>
+            <a:off x="8475550" y="370817"/>
+            <a:ext cx="3106725" cy="3058183"/>
+          </a:xfrm>
+          <a:prstGeom prst="rect">
+            <a:avLst/>
+          </a:prstGeom>
+        </p:spPr>
+      </p:pic>
     </p:spTree>
-    <p:extLst>
-      <p:ext uri="{BB962C8B-B14F-4D97-AF65-F5344CB8AC3E}">
-        <p14:creationId xmlns:p14="http://schemas.microsoft.com/office/powerpoint/2010/main" val="326920052"/>
-      </p:ext>
-    </p:extLst>
   </p:cSld>
   <p:clrMapOvr>
     <a:masterClrMapping/>
   </p:clrMapOvr>
-  <mc:AlternateContent xmlns:mc="http://schemas.openxmlformats.org/markup-compatibility/2006" xmlns:p14="http://schemas.microsoft.com/office/powerpoint/2010/main">
-    <mc:Choice Requires="p14">
-      <p:transition spd="med" p14:dur="700">
-        <p:fade/>
-      </p:transition>
-    </mc:Choice>
-    <mc:Fallback xmlns="">
-      <p:transition spd="med">
-        <p:fade/>
-      </p:transition>
-    </mc:Fallback>
-  </mc:AlternateContent>
 </p:sld>
 </file>
 
@@ -16570,7 +17414,12 @@
             <p:ph sz="quarter" idx="28"/>
           </p:nvPr>
         </p:nvSpPr>
-        <p:spPr/>
+        <p:spPr>
+          <a:xfrm>
+            <a:off x="571370" y="1673454"/>
+            <a:ext cx="11010900" cy="4816993"/>
+          </a:xfrm>
+        </p:spPr>
         <p:txBody>
           <a:bodyPr/>
           <a:lstStyle/>
@@ -16724,8 +17573,45 @@
               <a:t>Grammar for C (~1.4k LoC) vs grammar for Python (~2.4k LoC)</a:t>
             </a:r>
           </a:p>
+          <a:p>
+            <a:pPr lvl="1"/>
+            <a:r>
+              <a:rPr lang="en-US" dirty="0"/>
+              <a:t>One may not just separate libast.so from libpython.so.</a:t>
+            </a:r>
+          </a:p>
         </p:txBody>
       </p:sp>
+      <p:pic>
+        <p:nvPicPr>
+          <p:cNvPr id="5" name="Picture 4">
+            <a:extLst>
+              <a:ext uri="{FF2B5EF4-FFF2-40B4-BE49-F238E27FC236}">
+                <a16:creationId xmlns:a16="http://schemas.microsoft.com/office/drawing/2014/main" id="{665B3F7A-D74B-9F35-7E08-7F460EE59E24}"/>
+              </a:ext>
+            </a:extLst>
+          </p:cNvPr>
+          <p:cNvPicPr>
+            <a:picLocks noChangeAspect="1"/>
+          </p:cNvPicPr>
+          <p:nvPr/>
+        </p:nvPicPr>
+        <p:blipFill>
+          <a:blip r:embed="rId3"/>
+          <a:stretch>
+            <a:fillRect/>
+          </a:stretch>
+        </p:blipFill>
+        <p:spPr>
+          <a:xfrm>
+            <a:off x="9789179" y="5324701"/>
+            <a:ext cx="1515315" cy="1533300"/>
+          </a:xfrm>
+          <a:prstGeom prst="rect">
+            <a:avLst/>
+          </a:prstGeom>
+        </p:spPr>
+      </p:pic>
     </p:spTree>
     <p:extLst>
       <p:ext uri="{BB962C8B-B14F-4D97-AF65-F5344CB8AC3E}">
@@ -16923,6 +17809,82 @@
                                   </p:childTnLst>
                                 </p:cTn>
                               </p:par>
+                              <p:par>
+                                <p:cTn id="15" presetID="1" presetClass="entr" presetSubtype="0" fill="hold" nodeType="withEffect">
+                                  <p:stCondLst>
+                                    <p:cond delay="0"/>
+                                  </p:stCondLst>
+                                  <p:childTnLst>
+                                    <p:set>
+                                      <p:cBhvr>
+                                        <p:cTn id="16" dur="1" fill="hold">
+                                          <p:stCondLst>
+                                            <p:cond delay="0"/>
+                                          </p:stCondLst>
+                                        </p:cTn>
+                                        <p:tgtEl>
+                                          <p:spTgt spid="3">
+                                            <p:txEl>
+                                              <p:pRg st="8" end="8"/>
+                                            </p:txEl>
+                                          </p:spTgt>
+                                        </p:tgtEl>
+                                        <p:attrNameLst>
+                                          <p:attrName>style.visibility</p:attrName>
+                                        </p:attrNameLst>
+                                      </p:cBhvr>
+                                      <p:to>
+                                        <p:strVal val="visible"/>
+                                      </p:to>
+                                    </p:set>
+                                  </p:childTnLst>
+                                </p:cTn>
+                              </p:par>
+                            </p:childTnLst>
+                          </p:cTn>
+                        </p:par>
+                      </p:childTnLst>
+                    </p:cTn>
+                  </p:par>
+                  <p:par>
+                    <p:cTn id="17" fill="hold">
+                      <p:stCondLst>
+                        <p:cond delay="indefinite"/>
+                      </p:stCondLst>
+                      <p:childTnLst>
+                        <p:par>
+                          <p:cTn id="18" fill="hold">
+                            <p:stCondLst>
+                              <p:cond delay="0"/>
+                            </p:stCondLst>
+                            <p:childTnLst>
+                              <p:par>
+                                <p:cTn id="19" presetID="1" presetClass="entr" presetSubtype="0" fill="hold" nodeType="clickEffect">
+                                  <p:stCondLst>
+                                    <p:cond delay="0"/>
+                                  </p:stCondLst>
+                                  <p:childTnLst>
+                                    <p:set>
+                                      <p:cBhvr>
+                                        <p:cTn id="20" dur="1" fill="hold">
+                                          <p:stCondLst>
+                                            <p:cond delay="0"/>
+                                          </p:stCondLst>
+                                        </p:cTn>
+                                        <p:tgtEl>
+                                          <p:spTgt spid="5"/>
+                                        </p:tgtEl>
+                                        <p:attrNameLst>
+                                          <p:attrName>style.visibility</p:attrName>
+                                        </p:attrNameLst>
+                                      </p:cBhvr>
+                                      <p:to>
+                                        <p:strVal val="visible"/>
+                                      </p:to>
+                                    </p:set>
+                                  </p:childTnLst>
+                                </p:cTn>
+                              </p:par>
                             </p:childTnLst>
                           </p:cTn>
                         </p:par>
@@ -17076,7 +18038,7 @@
           <a:p>
             <a:r>
               <a:rPr lang="en-US" dirty="0"/>
-              <a:t>Use </a:t>
+              <a:t>Maybe use </a:t>
             </a:r>
             <a:r>
               <a:rPr lang="en-US" dirty="0">
@@ -20316,18 +21278,18 @@
 </file>
 
 <file path=customXml/item1.xml><?xml version="1.0" encoding="utf-8"?>
+<p:properties xmlns:p="http://schemas.microsoft.com/office/2006/metadata/properties" xmlns:xsi="http://www.w3.org/2001/XMLSchema-instance" xmlns:pc="http://schemas.microsoft.com/office/infopath/2007/PartnerControls">
+  <documentManagement/>
+</p:properties>
+</file>
+
+<file path=customXml/item2.xml><?xml version="1.0" encoding="utf-8"?>
 <?mso-contentType ?>
 <FormTemplates xmlns="http://schemas.microsoft.com/sharepoint/v3/contenttype/forms">
   <Display>DocumentLibraryForm</Display>
   <Edit>DocumentLibraryForm</Edit>
   <New>DocumentLibraryForm</New>
 </FormTemplates>
-</file>
-
-<file path=customXml/item2.xml><?xml version="1.0" encoding="utf-8"?>
-<p:properties xmlns:p="http://schemas.microsoft.com/office/2006/metadata/properties" xmlns:xsi="http://www.w3.org/2001/XMLSchema-instance" xmlns:pc="http://schemas.microsoft.com/office/infopath/2007/PartnerControls">
-  <documentManagement/>
-</p:properties>
 </file>
 
 <file path=customXml/item3.xml><?xml version="1.0" encoding="utf-8"?>
@@ -20489,18 +21451,18 @@
 </file>
 
 <file path=customXml/itemProps1.xml><?xml version="1.0" encoding="utf-8"?>
-<ds:datastoreItem xmlns:ds="http://schemas.openxmlformats.org/officeDocument/2006/customXml" ds:itemID="{201C66F3-FBD8-4B0F-98D9-445FE3649D01}">
+<ds:datastoreItem xmlns:ds="http://schemas.openxmlformats.org/officeDocument/2006/customXml" ds:itemID="{724B8A99-8161-4D52-8DFD-478F5C1B3170}">
   <ds:schemaRefs>
-    <ds:schemaRef ds:uri="http://schemas.microsoft.com/sharepoint/v3/contenttype/forms"/>
+    <ds:schemaRef ds:uri="http://schemas.microsoft.com/office/2006/metadata/properties"/>
+    <ds:schemaRef ds:uri="http://schemas.microsoft.com/office/infopath/2007/PartnerControls"/>
   </ds:schemaRefs>
 </ds:datastoreItem>
 </file>
 
 <file path=customXml/itemProps2.xml><?xml version="1.0" encoding="utf-8"?>
-<ds:datastoreItem xmlns:ds="http://schemas.openxmlformats.org/officeDocument/2006/customXml" ds:itemID="{724B8A99-8161-4D52-8DFD-478F5C1B3170}">
+<ds:datastoreItem xmlns:ds="http://schemas.openxmlformats.org/officeDocument/2006/customXml" ds:itemID="{201C66F3-FBD8-4B0F-98D9-445FE3649D01}">
   <ds:schemaRefs>
-    <ds:schemaRef ds:uri="http://schemas.microsoft.com/office/2006/metadata/properties"/>
-    <ds:schemaRef ds:uri="http://schemas.microsoft.com/office/infopath/2007/PartnerControls"/>
+    <ds:schemaRef ds:uri="http://schemas.microsoft.com/sharepoint/v3/contenttype/forms"/>
   </ds:schemaRefs>
 </ds:datastoreItem>
 </file>

</xml_diff>